<commit_message>
Luotu ikkunoita 1. toiminnon toimintaa varten -JL
</commit_message>
<xml_diff>
--- a/Konsolimalli.pptx
+++ b/Konsolimalli.pptx
@@ -266,7 +266,7 @@
           <a:p>
             <a:fld id="{76A827CD-4CFA-4934-9E87-30168D0AF433}" type="datetimeFigureOut">
               <a:rPr lang="en-FI" smtClean="0"/>
-              <a:t>22/02/2024</a:t>
+              <a:t>02/26/2024</a:t>
             </a:fld>
             <a:endParaRPr lang="en-FI"/>
           </a:p>
@@ -466,7 +466,7 @@
           <a:p>
             <a:fld id="{76A827CD-4CFA-4934-9E87-30168D0AF433}" type="datetimeFigureOut">
               <a:rPr lang="en-FI" smtClean="0"/>
-              <a:t>22/02/2024</a:t>
+              <a:t>02/26/2024</a:t>
             </a:fld>
             <a:endParaRPr lang="en-FI"/>
           </a:p>
@@ -676,7 +676,7 @@
           <a:p>
             <a:fld id="{76A827CD-4CFA-4934-9E87-30168D0AF433}" type="datetimeFigureOut">
               <a:rPr lang="en-FI" smtClean="0"/>
-              <a:t>22/02/2024</a:t>
+              <a:t>02/26/2024</a:t>
             </a:fld>
             <a:endParaRPr lang="en-FI"/>
           </a:p>
@@ -876,7 +876,7 @@
           <a:p>
             <a:fld id="{76A827CD-4CFA-4934-9E87-30168D0AF433}" type="datetimeFigureOut">
               <a:rPr lang="en-FI" smtClean="0"/>
-              <a:t>22/02/2024</a:t>
+              <a:t>02/26/2024</a:t>
             </a:fld>
             <a:endParaRPr lang="en-FI"/>
           </a:p>
@@ -1152,7 +1152,7 @@
           <a:p>
             <a:fld id="{76A827CD-4CFA-4934-9E87-30168D0AF433}" type="datetimeFigureOut">
               <a:rPr lang="en-FI" smtClean="0"/>
-              <a:t>22/02/2024</a:t>
+              <a:t>02/26/2024</a:t>
             </a:fld>
             <a:endParaRPr lang="en-FI"/>
           </a:p>
@@ -1420,7 +1420,7 @@
           <a:p>
             <a:fld id="{76A827CD-4CFA-4934-9E87-30168D0AF433}" type="datetimeFigureOut">
               <a:rPr lang="en-FI" smtClean="0"/>
-              <a:t>22/02/2024</a:t>
+              <a:t>02/26/2024</a:t>
             </a:fld>
             <a:endParaRPr lang="en-FI"/>
           </a:p>
@@ -1835,7 +1835,7 @@
           <a:p>
             <a:fld id="{76A827CD-4CFA-4934-9E87-30168D0AF433}" type="datetimeFigureOut">
               <a:rPr lang="en-FI" smtClean="0"/>
-              <a:t>22/02/2024</a:t>
+              <a:t>02/26/2024</a:t>
             </a:fld>
             <a:endParaRPr lang="en-FI"/>
           </a:p>
@@ -1977,7 +1977,7 @@
           <a:p>
             <a:fld id="{76A827CD-4CFA-4934-9E87-30168D0AF433}" type="datetimeFigureOut">
               <a:rPr lang="en-FI" smtClean="0"/>
-              <a:t>22/02/2024</a:t>
+              <a:t>02/26/2024</a:t>
             </a:fld>
             <a:endParaRPr lang="en-FI"/>
           </a:p>
@@ -2090,7 +2090,7 @@
           <a:p>
             <a:fld id="{76A827CD-4CFA-4934-9E87-30168D0AF433}" type="datetimeFigureOut">
               <a:rPr lang="en-FI" smtClean="0"/>
-              <a:t>22/02/2024</a:t>
+              <a:t>02/26/2024</a:t>
             </a:fld>
             <a:endParaRPr lang="en-FI"/>
           </a:p>
@@ -2403,7 +2403,7 @@
           <a:p>
             <a:fld id="{76A827CD-4CFA-4934-9E87-30168D0AF433}" type="datetimeFigureOut">
               <a:rPr lang="en-FI" smtClean="0"/>
-              <a:t>22/02/2024</a:t>
+              <a:t>02/26/2024</a:t>
             </a:fld>
             <a:endParaRPr lang="en-FI"/>
           </a:p>
@@ -2692,7 +2692,7 @@
           <a:p>
             <a:fld id="{76A827CD-4CFA-4934-9E87-30168D0AF433}" type="datetimeFigureOut">
               <a:rPr lang="en-FI" smtClean="0"/>
-              <a:t>22/02/2024</a:t>
+              <a:t>02/26/2024</a:t>
             </a:fld>
             <a:endParaRPr lang="en-FI"/>
           </a:p>
@@ -2935,7 +2935,7 @@
           <a:p>
             <a:fld id="{76A827CD-4CFA-4934-9E87-30168D0AF433}" type="datetimeFigureOut">
               <a:rPr lang="en-FI" smtClean="0"/>
-              <a:t>22/02/2024</a:t>
+              <a:t>02/26/2024</a:t>
             </a:fld>
             <a:endParaRPr lang="en-FI"/>
           </a:p>
@@ -6032,7 +6032,7 @@
         </p:nvSpPr>
         <p:spPr>
           <a:xfrm>
-            <a:off x="-15241" y="1317625"/>
+            <a:off x="-15242" y="1240271"/>
             <a:ext cx="1355154" cy="786606"/>
           </a:xfrm>
           <a:prstGeom prst="rect">

</xml_diff>